<commit_message>
Documentation and PPT Update
</commit_message>
<xml_diff>
--- a/source/NeoCortexApi/Documents/Group Presentation[ScalarEncoder with Buckets].pptx
+++ b/source/NeoCortexApi/Documents/Group Presentation[ScalarEncoder with Buckets].pptx
@@ -10,6 +10,8 @@
     <p:sldId id="261" r:id="rId4"/>
     <p:sldId id="262" r:id="rId5"/>
     <p:sldId id="263" r:id="rId6"/>
+    <p:sldId id="264" r:id="rId7"/>
+    <p:sldId id="265" r:id="rId8"/>
   </p:sldIdLst>
   <p:sldSz cx="12192000" cy="6858000"/>
   <p:notesSz cx="6858000" cy="9144000"/>
@@ -129,10 +131,19 @@
         <p14:section name="Introduction" id="{3CCB18DD-DB03-4E98-9518-ED1A274A0614}">
           <p14:sldIdLst>
             <p14:sldId id="262"/>
+          </p14:sldIdLst>
+        </p14:section>
+        <p14:section name="Literature Survey" id="{760B03CA-ABA5-4B58-B8C5-DC5A1AAF99F3}">
+          <p14:sldIdLst>
             <p14:sldId id="263"/>
+            <p14:sldId id="264"/>
+            <p14:sldId id="265"/>
           </p14:sldIdLst>
         </p14:section>
       </p14:sectionLst>
+    </p:ext>
+    <p:ext uri="{EFAFB233-063F-42B5-8137-9DF3F51BA10A}">
+      <p15:sldGuideLst xmlns:p15="http://schemas.microsoft.com/office/powerpoint/2012/main"/>
     </p:ext>
   </p:extLst>
 </p:presentation>
@@ -207,7 +218,7 @@
           <a:p>
             <a:fld id="{1A460770-223A-490F-86CD-F601AF5780BC}" type="datetimeFigureOut">
               <a:rPr lang="en-IN" smtClean="0"/>
-              <a:t>19-03-2023</a:t>
+              <a:t>28-03-2023</a:t>
             </a:fld>
             <a:endParaRPr lang="en-IN"/>
           </a:p>
@@ -450,7 +461,7 @@
           <a:p>
             <a:fld id="{1A460770-223A-490F-86CD-F601AF5780BC}" type="datetimeFigureOut">
               <a:rPr lang="en-IN" smtClean="0"/>
-              <a:t>19-03-2023</a:t>
+              <a:t>28-03-2023</a:t>
             </a:fld>
             <a:endParaRPr lang="en-IN"/>
           </a:p>
@@ -1067,7 +1078,7 @@
         <p:spPr>
           <a:xfrm>
             <a:off x="1429566" y="2286000"/>
-            <a:ext cx="9238434" cy="1548063"/>
+            <a:ext cx="9238434" cy="2403987"/>
           </a:xfrm>
           <a:prstGeom prst="rect">
             <a:avLst/>
@@ -1240,17 +1251,19 @@
             </a:lvl9pPr>
           </a:lstStyle>
           <a:p>
-            <a:pPr algn="ctr"/>
+            <a:pPr algn="just"/>
             <a:r>
-              <a:rPr lang="en-US" dirty="0">
-                <a:solidFill>
-                  <a:schemeClr val="tx1">
-                    <a:lumMod val="95000"/>
-                  </a:schemeClr>
-                </a:solidFill>
+              <a:rPr lang="en-US" dirty="0"/>
+              <a:t>The primary objective </a:t>
+            </a:r>
+            <a:r>
+              <a:rPr lang="en-US" b="0" i="0" dirty="0">
+                <a:effectLst/>
+                <a:latin typeface="Söhne"/>
               </a:rPr>
-              <a:t>The primary The primary objective of this project is to examine the Scalar Encoder with Buckets and understand the implementation by Test Cases.</a:t>
+              <a:t>is to implement scalar encoders with buckets. It seeks to investigate the best practices for selecting the number and breadth of buckets, to compare scalar encoding with buckets to other encoding systems, and to assess the performance of scalar encoding with buckets.</a:t>
             </a:r>
+            <a:endParaRPr lang="en-US" dirty="0"/>
           </a:p>
         </p:txBody>
       </p:sp>
@@ -1333,7 +1346,7 @@
         <p:spPr>
           <a:xfrm>
             <a:off x="756778" y="1690688"/>
-            <a:ext cx="10597023" cy="4524315"/>
+            <a:ext cx="10597023" cy="3416320"/>
           </a:xfrm>
           <a:prstGeom prst="rect">
             <a:avLst/>
@@ -1352,7 +1365,7 @@
             </a:pPr>
             <a:r>
               <a:rPr lang="en-US" sz="3600" dirty="0"/>
-              <a:t>INTRODUCTION	</a:t>
+              <a:t>Introduction	</a:t>
             </a:r>
           </a:p>
           <a:p>
@@ -1362,7 +1375,7 @@
             </a:pPr>
             <a:r>
               <a:rPr lang="en-US" sz="3600" dirty="0"/>
-              <a:t>METHODOLGY</a:t>
+              <a:t>Methodology</a:t>
             </a:r>
           </a:p>
           <a:p>
@@ -1372,7 +1385,7 @@
             </a:pPr>
             <a:r>
               <a:rPr lang="en-US" sz="3600" dirty="0"/>
-              <a:t>ENCODING</a:t>
+              <a:t>Implementation Buckets</a:t>
             </a:r>
           </a:p>
           <a:p>
@@ -1382,7 +1395,7 @@
             </a:pPr>
             <a:r>
               <a:rPr lang="en-US" sz="3600" dirty="0"/>
-              <a:t>WORKING ON SPATIAL POOLER</a:t>
+              <a:t>Testcases</a:t>
             </a:r>
           </a:p>
           <a:p>
@@ -1392,7 +1405,7 @@
             </a:pPr>
             <a:r>
               <a:rPr lang="en-US" sz="3600" dirty="0"/>
-              <a:t>IMPLEMENTATION (LEARNING &amp; EXECUTE TEST CASES)</a:t>
+              <a:t>Results</a:t>
             </a:r>
           </a:p>
           <a:p>
@@ -1402,17 +1415,7 @@
             </a:pPr>
             <a:r>
               <a:rPr lang="en-US" sz="3600" dirty="0"/>
-              <a:t>RESULTS</a:t>
-            </a:r>
-          </a:p>
-          <a:p>
-            <a:pPr marL="571500" indent="-571500">
-              <a:buFont typeface="Arial" panose="020B0604020202020204" pitchFamily="34" charset="0"/>
-              <a:buChar char="•"/>
-            </a:pPr>
-            <a:r>
-              <a:rPr lang="en-US" sz="3600" dirty="0"/>
-              <a:t>CONCLUSION</a:t>
+              <a:t>Conclusion</a:t>
             </a:r>
             <a:endParaRPr lang="en-IN" sz="3600" dirty="0"/>
           </a:p>
@@ -1534,7 +1537,7 @@
         </p:nvSpPr>
         <p:spPr>
           <a:xfrm>
-            <a:off x="643468" y="643467"/>
+            <a:off x="820449" y="192487"/>
             <a:ext cx="4056869" cy="944701"/>
           </a:xfrm>
         </p:spPr>
@@ -2057,8 +2060,8 @@
         </p:nvSpPr>
         <p:spPr>
           <a:xfrm>
-            <a:off x="643468" y="2555847"/>
-            <a:ext cx="5585747" cy="2862322"/>
+            <a:off x="643468" y="1360762"/>
+            <a:ext cx="6416093" cy="4062651"/>
           </a:xfrm>
           <a:prstGeom prst="rect">
             <a:avLst/>
@@ -2071,13 +2074,16 @@
           </a:bodyPr>
           <a:lstStyle/>
           <a:p>
+            <a:endParaRPr lang="en-US" dirty="0"/>
+          </a:p>
+          <a:p>
             <a:pPr marL="285750" indent="-285750">
               <a:buFont typeface="Arial" panose="020B0604020202020204" pitchFamily="34" charset="0"/>
               <a:buChar char="•"/>
             </a:pPr>
             <a:r>
-              <a:rPr lang="en-US" dirty="0"/>
-              <a:t>Medical Science and ML engineers were working on the understanding of cortex for temporal pattern recognition.</a:t>
+              <a:rPr lang="en-US" sz="1600" dirty="0"/>
+              <a:t>Scalar encoder with buckets is a method of transforming continuous data into discrete values that can be utilized for analysis, modeling, and machine learning. It entails segmenting continuous values into intervals or "buckets" and assigning them to the appropriate buckets. This method is adaptable and can be used in a variety of applications such as sensor data analysis, natural language processing, and image classification.</a:t>
             </a:r>
           </a:p>
           <a:p>
@@ -2085,14 +2091,14 @@
               <a:buFont typeface="Arial" panose="020B0604020202020204" pitchFamily="34" charset="0"/>
               <a:buChar char="•"/>
             </a:pPr>
-            <a:endParaRPr lang="en-US" dirty="0"/>
+            <a:endParaRPr lang="en-US" sz="1600" dirty="0"/>
           </a:p>
           <a:p>
             <a:pPr marL="285750" indent="-285750">
               <a:buFont typeface="Arial" panose="020B0604020202020204" pitchFamily="34" charset="0"/>
               <a:buChar char="•"/>
             </a:pPr>
-            <a:endParaRPr lang="en-US" dirty="0"/>
+            <a:endParaRPr lang="en-US" sz="1600" dirty="0"/>
           </a:p>
           <a:p>
             <a:pPr marL="285750" indent="-285750">
@@ -2100,32 +2106,16 @@
               <a:buChar char="•"/>
             </a:pPr>
             <a:r>
-              <a:rPr lang="en-US" b="0" i="0" dirty="0">
-                <a:solidFill>
-                  <a:schemeClr val="tx1">
-                    <a:lumMod val="95000"/>
-                  </a:schemeClr>
-                </a:solidFill>
-                <a:effectLst/>
-                <a:latin typeface="Söhne"/>
-              </a:rPr>
-              <a:t>Scalar Encoder with buckets is a technique used in natural language processing (NLP) to encode numerical values (e.g., prices, temperatures, etc.) into continuous vectors that can be used as inputs to machine learning models</a:t>
-            </a:r>
-            <a:r>
-              <a:rPr lang="en-US" b="0" i="0" dirty="0">
+              <a:rPr lang="en-US" sz="1600" b="0" i="0" dirty="0">
                 <a:solidFill>
                   <a:srgbClr val="374151"/>
                 </a:solidFill>
                 <a:effectLst/>
                 <a:latin typeface="Söhne"/>
               </a:rPr>
-              <a:t>.</a:t>
+              <a:t>Scientists study the cortex to understand sequence learning, and models based on neural readings are used to recognize sequences. However, these models may not work in real-world situations. Hierarchical Temporal Memory (HTM) is a biomimetic model based on the neocortex's features, which has shown promise in pattern recognition and learning the sequences and flow of sensory inputs.</a:t>
             </a:r>
-            <a:endParaRPr lang="en-IN" dirty="0">
-              <a:solidFill>
-                <a:srgbClr val="FFFFFF"/>
-              </a:solidFill>
-            </a:endParaRPr>
+            <a:endParaRPr lang="en-US" sz="1600" dirty="0"/>
           </a:p>
         </p:txBody>
       </p:sp>
@@ -2145,6 +2135,984 @@
 <file path=ppt/slides/slide5.xml><?xml version="1.0" encoding="utf-8"?>
 <p:sld xmlns:a="http://schemas.openxmlformats.org/drawingml/2006/main" xmlns:r="http://schemas.openxmlformats.org/officeDocument/2006/relationships" xmlns:p="http://schemas.openxmlformats.org/presentationml/2006/main">
   <p:cSld>
+    <p:bg>
+      <p:bgPr>
+        <a:solidFill>
+          <a:schemeClr val="bg1"/>
+        </a:solidFill>
+        <a:effectLst/>
+      </p:bgPr>
+    </p:bg>
+    <p:spTree>
+      <p:nvGrpSpPr>
+        <p:cNvPr id="1" name=""/>
+        <p:cNvGrpSpPr/>
+        <p:nvPr/>
+      </p:nvGrpSpPr>
+      <p:grpSpPr>
+        <a:xfrm>
+          <a:off x="0" y="0"/>
+          <a:ext cx="0" cy="0"/>
+          <a:chOff x="0" y="0"/>
+          <a:chExt cx="0" cy="0"/>
+        </a:xfrm>
+      </p:grpSpPr>
+      <p:sp useBgFill="1">
+        <p:nvSpPr>
+          <p:cNvPr id="19" name="Rectangle 12">
+            <a:extLst>
+              <a:ext uri="{FF2B5EF4-FFF2-40B4-BE49-F238E27FC236}">
+                <a16:creationId xmlns:a16="http://schemas.microsoft.com/office/drawing/2014/main" id="{06DA9DF9-31F7-4056-B42E-878CC92417B8}"/>
+              </a:ext>
+              <a:ext uri="{C183D7F6-B498-43B3-948B-1728B52AA6E4}">
+                <adec:decorative xmlns:adec="http://schemas.microsoft.com/office/drawing/2017/decorative" val="1"/>
+              </a:ext>
+            </a:extLst>
+          </p:cNvPr>
+          <p:cNvSpPr>
+            <a:spLocks noGrp="1" noRot="1" noChangeAspect="1" noMove="1" noResize="1" noEditPoints="1" noAdjustHandles="1" noChangeArrowheads="1" noChangeShapeType="1" noTextEdit="1"/>
+          </p:cNvSpPr>
+          <p:nvPr>
+            <p:extLst>
+              <p:ext uri="{386F3935-93C4-4BCD-93E2-E3B085C9AB24}">
+                <p16:designElem xmlns:p16="http://schemas.microsoft.com/office/powerpoint/2015/main" val="1"/>
+              </p:ext>
+            </p:extLst>
+          </p:nvPr>
+        </p:nvSpPr>
+        <p:spPr>
+          <a:xfrm>
+            <a:off x="0" y="0"/>
+            <a:ext cx="12188952" cy="6858000"/>
+          </a:xfrm>
+          <a:prstGeom prst="rect">
+            <a:avLst/>
+          </a:prstGeom>
+          <a:ln>
+            <a:noFill/>
+          </a:ln>
+        </p:spPr>
+        <p:style>
+          <a:lnRef idx="2">
+            <a:schemeClr val="accent1">
+              <a:shade val="50000"/>
+            </a:schemeClr>
+          </a:lnRef>
+          <a:fillRef idx="1">
+            <a:schemeClr val="accent1"/>
+          </a:fillRef>
+          <a:effectRef idx="0">
+            <a:schemeClr val="accent1"/>
+          </a:effectRef>
+          <a:fontRef idx="minor">
+            <a:schemeClr val="lt1"/>
+          </a:fontRef>
+        </p:style>
+        <p:txBody>
+          <a:bodyPr rtlCol="0" anchor="ctr"/>
+          <a:lstStyle/>
+          <a:p>
+            <a:pPr algn="ctr"/>
+            <a:endParaRPr lang="en-US"/>
+          </a:p>
+        </p:txBody>
+      </p:sp>
+      <p:sp>
+        <p:nvSpPr>
+          <p:cNvPr id="7" name="Title 6">
+            <a:extLst>
+              <a:ext uri="{FF2B5EF4-FFF2-40B4-BE49-F238E27FC236}">
+                <a16:creationId xmlns:a16="http://schemas.microsoft.com/office/drawing/2014/main" id="{3E8FD3DC-D75D-57C5-F44D-437B8601DFEE}"/>
+              </a:ext>
+            </a:extLst>
+          </p:cNvPr>
+          <p:cNvSpPr>
+            <a:spLocks noGrp="1"/>
+          </p:cNvSpPr>
+          <p:nvPr>
+            <p:ph type="title"/>
+          </p:nvPr>
+        </p:nvSpPr>
+        <p:spPr>
+          <a:xfrm>
+            <a:off x="732182" y="331566"/>
+            <a:ext cx="4620584" cy="752714"/>
+          </a:xfrm>
+        </p:spPr>
+        <p:txBody>
+          <a:bodyPr vert="horz" lIns="91440" tIns="45720" rIns="91440" bIns="45720" rtlCol="0" anchor="b">
+            <a:normAutofit/>
+          </a:bodyPr>
+          <a:lstStyle/>
+          <a:p>
+            <a:r>
+              <a:rPr lang="en-US" dirty="0"/>
+              <a:t>Literature Survey</a:t>
+            </a:r>
+          </a:p>
+        </p:txBody>
+      </p:sp>
+      <p:pic>
+        <p:nvPicPr>
+          <p:cNvPr id="20" name="Picture 8" descr="Different numbers in white flying around">
+            <a:extLst>
+              <a:ext uri="{FF2B5EF4-FFF2-40B4-BE49-F238E27FC236}">
+                <a16:creationId xmlns:a16="http://schemas.microsoft.com/office/drawing/2014/main" id="{730BD39C-97A9-C443-4EBF-4E2826334507}"/>
+              </a:ext>
+            </a:extLst>
+          </p:cNvPr>
+          <p:cNvPicPr>
+            <a:picLocks noChangeAspect="1"/>
+          </p:cNvPicPr>
+          <p:nvPr/>
+        </p:nvPicPr>
+        <p:blipFill rotWithShape="1">
+          <a:blip r:embed="rId2"/>
+          <a:srcRect l="19186" r="15604"/>
+          <a:stretch/>
+        </p:blipFill>
+        <p:spPr>
+          <a:xfrm>
+            <a:off x="6229215" y="10"/>
+            <a:ext cx="5962785" cy="6857990"/>
+          </a:xfrm>
+          <a:custGeom>
+            <a:avLst/>
+            <a:gdLst/>
+            <a:ahLst/>
+            <a:cxnLst/>
+            <a:rect l="l" t="t" r="r" b="b"/>
+            <a:pathLst>
+              <a:path w="5962785" h="6858000">
+                <a:moveTo>
+                  <a:pt x="1044839" y="0"/>
+                </a:moveTo>
+                <a:lnTo>
+                  <a:pt x="5962785" y="0"/>
+                </a:lnTo>
+                <a:lnTo>
+                  <a:pt x="5962785" y="6858000"/>
+                </a:lnTo>
+                <a:lnTo>
+                  <a:pt x="1469886" y="6858000"/>
+                </a:lnTo>
+                <a:lnTo>
+                  <a:pt x="1416006" y="6823984"/>
+                </a:lnTo>
+                <a:cubicBezTo>
+                  <a:pt x="1356767" y="6787940"/>
+                  <a:pt x="1296437" y="6755500"/>
+                  <a:pt x="1232473" y="6733873"/>
+                </a:cubicBezTo>
+                <a:cubicBezTo>
+                  <a:pt x="1145250" y="6705037"/>
+                  <a:pt x="1060933" y="6654575"/>
+                  <a:pt x="1075471" y="6503186"/>
+                </a:cubicBezTo>
+                <a:cubicBezTo>
+                  <a:pt x="1078378" y="6459932"/>
+                  <a:pt x="1055118" y="6427493"/>
+                  <a:pt x="1020229" y="6438306"/>
+                </a:cubicBezTo>
+                <a:cubicBezTo>
+                  <a:pt x="953358" y="6459932"/>
+                  <a:pt x="921375" y="6398656"/>
+                  <a:pt x="883579" y="6351798"/>
+                </a:cubicBezTo>
+                <a:cubicBezTo>
+                  <a:pt x="816707" y="6268895"/>
+                  <a:pt x="752743" y="6182387"/>
+                  <a:pt x="645167" y="6167969"/>
+                </a:cubicBezTo>
+                <a:cubicBezTo>
+                  <a:pt x="665519" y="6103088"/>
+                  <a:pt x="700408" y="6110298"/>
+                  <a:pt x="732391" y="6124716"/>
+                </a:cubicBezTo>
+                <a:cubicBezTo>
+                  <a:pt x="816707" y="6160761"/>
+                  <a:pt x="901023" y="6200410"/>
+                  <a:pt x="985339" y="6236455"/>
+                </a:cubicBezTo>
+                <a:cubicBezTo>
+                  <a:pt x="1040581" y="6258081"/>
+                  <a:pt x="1095822" y="6290522"/>
+                  <a:pt x="1168509" y="6265291"/>
+                </a:cubicBezTo>
+                <a:cubicBezTo>
+                  <a:pt x="1104545" y="6135530"/>
+                  <a:pt x="996969" y="6110298"/>
+                  <a:pt x="909746" y="6070649"/>
+                </a:cubicBezTo>
+                <a:cubicBezTo>
+                  <a:pt x="802169" y="6020185"/>
+                  <a:pt x="738206" y="5926470"/>
+                  <a:pt x="659704" y="5818335"/>
+                </a:cubicBezTo>
+                <a:cubicBezTo>
+                  <a:pt x="738206" y="5789500"/>
+                  <a:pt x="787632" y="5868798"/>
+                  <a:pt x="851597" y="5865193"/>
+                </a:cubicBezTo>
+                <a:cubicBezTo>
+                  <a:pt x="854504" y="5854380"/>
+                  <a:pt x="860319" y="5832753"/>
+                  <a:pt x="860319" y="5832753"/>
+                </a:cubicBezTo>
+                <a:cubicBezTo>
+                  <a:pt x="755650" y="5775081"/>
+                  <a:pt x="709132" y="5666947"/>
+                  <a:pt x="691686" y="5533581"/>
+                </a:cubicBezTo>
+                <a:cubicBezTo>
+                  <a:pt x="685872" y="5465095"/>
+                  <a:pt x="648075" y="5443468"/>
+                  <a:pt x="610278" y="5411029"/>
+                </a:cubicBezTo>
+                <a:cubicBezTo>
+                  <a:pt x="482350" y="5299289"/>
+                  <a:pt x="345700" y="5198364"/>
+                  <a:pt x="238123" y="5046976"/>
+                </a:cubicBezTo>
+                <a:cubicBezTo>
+                  <a:pt x="363144" y="5064998"/>
+                  <a:pt x="461997" y="5165924"/>
+                  <a:pt x="592833" y="5209177"/>
+                </a:cubicBezTo>
+                <a:cubicBezTo>
+                  <a:pt x="488165" y="5043371"/>
+                  <a:pt x="351514" y="4956864"/>
+                  <a:pt x="226494" y="4855939"/>
+                </a:cubicBezTo>
+                <a:cubicBezTo>
+                  <a:pt x="168344" y="4809081"/>
+                  <a:pt x="116011" y="4751408"/>
+                  <a:pt x="49139" y="4726177"/>
+                </a:cubicBezTo>
+                <a:cubicBezTo>
+                  <a:pt x="25879" y="4718968"/>
+                  <a:pt x="-14825" y="4700947"/>
+                  <a:pt x="5527" y="4650483"/>
+                </a:cubicBezTo>
+                <a:cubicBezTo>
+                  <a:pt x="22972" y="4607230"/>
+                  <a:pt x="54954" y="4621648"/>
+                  <a:pt x="84029" y="4632460"/>
+                </a:cubicBezTo>
+                <a:cubicBezTo>
+                  <a:pt x="153807" y="4661296"/>
+                  <a:pt x="229401" y="4661296"/>
+                  <a:pt x="325347" y="4661296"/>
+                </a:cubicBezTo>
+                <a:cubicBezTo>
+                  <a:pt x="243939" y="4524326"/>
+                  <a:pt x="95658" y="4567580"/>
+                  <a:pt x="25879" y="4423401"/>
+                </a:cubicBezTo>
+                <a:cubicBezTo>
+                  <a:pt x="113103" y="4398170"/>
+                  <a:pt x="179975" y="4448632"/>
+                  <a:pt x="249753" y="4459446"/>
+                </a:cubicBezTo>
+                <a:cubicBezTo>
+                  <a:pt x="313718" y="4470259"/>
+                  <a:pt x="328254" y="4445028"/>
+                  <a:pt x="313718" y="4365729"/>
+                </a:cubicBezTo>
+                <a:cubicBezTo>
+                  <a:pt x="290458" y="4243177"/>
+                  <a:pt x="325347" y="4181900"/>
+                  <a:pt x="418386" y="4214341"/>
+                </a:cubicBezTo>
+                <a:cubicBezTo>
+                  <a:pt x="505609" y="4246781"/>
+                  <a:pt x="514332" y="4199922"/>
+                  <a:pt x="491072" y="4131438"/>
+                </a:cubicBezTo>
+                <a:cubicBezTo>
+                  <a:pt x="456183" y="4030512"/>
+                  <a:pt x="493979" y="3951214"/>
+                  <a:pt x="520147" y="3864706"/>
+                </a:cubicBezTo>
+                <a:cubicBezTo>
+                  <a:pt x="560851" y="3734945"/>
+                  <a:pt x="543407" y="3670064"/>
+                  <a:pt x="459090" y="3572743"/>
+                </a:cubicBezTo>
+                <a:cubicBezTo>
+                  <a:pt x="409664" y="3518676"/>
+                  <a:pt x="360236" y="3471818"/>
+                  <a:pt x="290458" y="3424959"/>
+                </a:cubicBezTo>
+                <a:cubicBezTo>
+                  <a:pt x="450368" y="3399728"/>
+                  <a:pt x="284643" y="3313221"/>
+                  <a:pt x="339884" y="3259153"/>
+                </a:cubicBezTo>
+                <a:cubicBezTo>
+                  <a:pt x="453275" y="3237527"/>
+                  <a:pt x="543407" y="3410542"/>
+                  <a:pt x="697501" y="3360078"/>
+                </a:cubicBezTo>
+                <a:cubicBezTo>
+                  <a:pt x="511425" y="3212294"/>
+                  <a:pt x="302087" y="3165436"/>
+                  <a:pt x="165437" y="2967190"/>
+                </a:cubicBezTo>
+                <a:cubicBezTo>
+                  <a:pt x="197419" y="2923937"/>
+                  <a:pt x="229401" y="2967190"/>
+                  <a:pt x="255568" y="2949167"/>
+                </a:cubicBezTo>
+                <a:cubicBezTo>
+                  <a:pt x="255568" y="2938354"/>
+                  <a:pt x="560851" y="3006840"/>
+                  <a:pt x="578296" y="2725691"/>
+                </a:cubicBezTo>
+                <a:cubicBezTo>
+                  <a:pt x="584111" y="2725691"/>
+                  <a:pt x="589926" y="2725691"/>
+                  <a:pt x="595740" y="2714876"/>
+                </a:cubicBezTo>
+                <a:cubicBezTo>
+                  <a:pt x="627722" y="2675228"/>
+                  <a:pt x="598648" y="2581510"/>
+                  <a:pt x="650982" y="2574301"/>
+                </a:cubicBezTo>
+                <a:cubicBezTo>
+                  <a:pt x="709132" y="2567092"/>
+                  <a:pt x="764373" y="2534653"/>
+                  <a:pt x="825429" y="2552674"/>
+                </a:cubicBezTo>
+                <a:cubicBezTo>
+                  <a:pt x="871949" y="2567092"/>
+                  <a:pt x="921375" y="2585115"/>
+                  <a:pt x="970802" y="2585115"/>
+                </a:cubicBezTo>
+                <a:cubicBezTo>
+                  <a:pt x="1023136" y="2585115"/>
+                  <a:pt x="1095822" y="2707668"/>
+                  <a:pt x="1127805" y="2545465"/>
+                </a:cubicBezTo>
+                <a:cubicBezTo>
+                  <a:pt x="1127805" y="2538257"/>
+                  <a:pt x="1217936" y="2556280"/>
+                  <a:pt x="1267362" y="2563488"/>
+                </a:cubicBezTo>
+                <a:cubicBezTo>
+                  <a:pt x="1308067" y="2570698"/>
+                  <a:pt x="1357494" y="2603137"/>
+                  <a:pt x="1386568" y="2538257"/>
+                </a:cubicBezTo>
+                <a:cubicBezTo>
+                  <a:pt x="1401105" y="2498607"/>
+                  <a:pt x="1331326" y="2426518"/>
+                  <a:pt x="1270270" y="2419309"/>
+                </a:cubicBezTo>
+                <a:cubicBezTo>
+                  <a:pt x="1215029" y="2412101"/>
+                  <a:pt x="1159787" y="2404892"/>
+                  <a:pt x="1107453" y="2419309"/>
+                </a:cubicBezTo>
+                <a:cubicBezTo>
+                  <a:pt x="1043489" y="2437331"/>
+                  <a:pt x="1008599" y="2408495"/>
+                  <a:pt x="991154" y="2343615"/>
+                </a:cubicBezTo>
+                <a:cubicBezTo>
+                  <a:pt x="970802" y="2275131"/>
+                  <a:pt x="933005" y="2239085"/>
+                  <a:pt x="880671" y="2206645"/>
+                </a:cubicBezTo>
+                <a:cubicBezTo>
+                  <a:pt x="752743" y="2127346"/>
+                  <a:pt x="630630" y="2033629"/>
+                  <a:pt x="491072" y="1986771"/>
+                </a:cubicBezTo>
+                <a:cubicBezTo>
+                  <a:pt x="464905" y="1979562"/>
+                  <a:pt x="432923" y="1965145"/>
+                  <a:pt x="421293" y="1903868"/>
+                </a:cubicBezTo>
+                <a:cubicBezTo>
+                  <a:pt x="799262" y="1997584"/>
+                  <a:pt x="1142342" y="2239085"/>
+                  <a:pt x="1531941" y="2224667"/>
+                </a:cubicBezTo>
+                <a:cubicBezTo>
+                  <a:pt x="1427272" y="2148974"/>
+                  <a:pt x="1302252" y="2145369"/>
+                  <a:pt x="1188861" y="2091301"/>
+                </a:cubicBezTo>
+                <a:cubicBezTo>
+                  <a:pt x="1270270" y="2051652"/>
+                  <a:pt x="1345864" y="2094906"/>
+                  <a:pt x="1421458" y="2116532"/>
+                </a:cubicBezTo>
+                <a:cubicBezTo>
+                  <a:pt x="1485422" y="2134554"/>
+                  <a:pt x="1543571" y="2138160"/>
+                  <a:pt x="1549386" y="2026420"/>
+                </a:cubicBezTo>
+                <a:cubicBezTo>
+                  <a:pt x="1549386" y="2015607"/>
+                  <a:pt x="1549386" y="2008398"/>
+                  <a:pt x="1549386" y="1997584"/>
+                </a:cubicBezTo>
+                <a:cubicBezTo>
+                  <a:pt x="1526126" y="1950727"/>
+                  <a:pt x="1494144" y="1929099"/>
+                  <a:pt x="1453440" y="1914682"/>
+                </a:cubicBezTo>
+                <a:cubicBezTo>
+                  <a:pt x="1430180" y="1907473"/>
+                  <a:pt x="1398198" y="1893056"/>
+                  <a:pt x="1398198" y="1860614"/>
+                </a:cubicBezTo>
+                <a:cubicBezTo>
+                  <a:pt x="1401105" y="1738063"/>
+                  <a:pt x="1322604" y="1702018"/>
+                  <a:pt x="1247011" y="1665972"/>
+                </a:cubicBezTo>
+                <a:cubicBezTo>
+                  <a:pt x="1287715" y="1604696"/>
+                  <a:pt x="1322604" y="1647950"/>
+                  <a:pt x="1354586" y="1644345"/>
+                </a:cubicBezTo>
+                <a:cubicBezTo>
+                  <a:pt x="1374939" y="1640741"/>
+                  <a:pt x="1395290" y="1637138"/>
+                  <a:pt x="1395290" y="1604696"/>
+                </a:cubicBezTo>
+                <a:cubicBezTo>
+                  <a:pt x="1395290" y="1579465"/>
+                  <a:pt x="1386568" y="1547025"/>
+                  <a:pt x="1366216" y="1547025"/>
+                </a:cubicBezTo>
+                <a:cubicBezTo>
+                  <a:pt x="1238288" y="1543420"/>
+                  <a:pt x="1165601" y="1370405"/>
+                  <a:pt x="1031858" y="1370405"/>
+                </a:cubicBezTo>
+                <a:cubicBezTo>
+                  <a:pt x="950450" y="1370405"/>
+                  <a:pt x="1072563" y="1273083"/>
+                  <a:pt x="1005692" y="1233435"/>
+                </a:cubicBezTo>
+                <a:cubicBezTo>
+                  <a:pt x="991154" y="1222621"/>
+                  <a:pt x="1046396" y="1208203"/>
+                  <a:pt x="1069655" y="1211808"/>
+                </a:cubicBezTo>
+                <a:cubicBezTo>
+                  <a:pt x="1092915" y="1215412"/>
+                  <a:pt x="1113268" y="1240644"/>
+                  <a:pt x="1142342" y="1222621"/>
+                </a:cubicBezTo>
+                <a:cubicBezTo>
+                  <a:pt x="1156879" y="1157741"/>
+                  <a:pt x="1119082" y="1132510"/>
+                  <a:pt x="1084193" y="1114487"/>
+                </a:cubicBezTo>
+                <a:cubicBezTo>
+                  <a:pt x="1008599" y="1071234"/>
+                  <a:pt x="933005" y="1020771"/>
+                  <a:pt x="848689" y="1006353"/>
+                </a:cubicBezTo>
+                <a:cubicBezTo>
+                  <a:pt x="819615" y="1002748"/>
+                  <a:pt x="802169" y="984726"/>
+                  <a:pt x="805077" y="948681"/>
+                </a:cubicBezTo>
+                <a:cubicBezTo>
+                  <a:pt x="810892" y="901822"/>
+                  <a:pt x="839967" y="916240"/>
+                  <a:pt x="863226" y="919844"/>
+                </a:cubicBezTo>
+                <a:cubicBezTo>
+                  <a:pt x="877764" y="923450"/>
+                  <a:pt x="892301" y="934263"/>
+                  <a:pt x="906838" y="909031"/>
+                </a:cubicBezTo>
+                <a:cubicBezTo>
+                  <a:pt x="566666" y="653113"/>
+                  <a:pt x="386404" y="667532"/>
+                  <a:pt x="5527" y="458471"/>
+                </a:cubicBezTo>
+                <a:cubicBezTo>
+                  <a:pt x="89843" y="418822"/>
+                  <a:pt x="150900" y="447658"/>
+                  <a:pt x="209049" y="454867"/>
+                </a:cubicBezTo>
+                <a:cubicBezTo>
+                  <a:pt x="354422" y="472890"/>
+                  <a:pt x="264290" y="505329"/>
+                  <a:pt x="409664" y="526956"/>
+                </a:cubicBezTo>
+                <a:cubicBezTo>
+                  <a:pt x="479443" y="537770"/>
+                  <a:pt x="543407" y="573815"/>
+                  <a:pt x="621908" y="516143"/>
+                </a:cubicBezTo>
+                <a:cubicBezTo>
+                  <a:pt x="674242" y="476494"/>
+                  <a:pt x="758558" y="519747"/>
+                  <a:pt x="822522" y="552188"/>
+                </a:cubicBezTo>
+                <a:cubicBezTo>
+                  <a:pt x="874856" y="581024"/>
+                  <a:pt x="927190" y="588232"/>
+                  <a:pt x="996969" y="552188"/>
+                </a:cubicBezTo>
+                <a:cubicBezTo>
+                  <a:pt x="933005" y="530562"/>
+                  <a:pt x="883579" y="512539"/>
+                  <a:pt x="834151" y="498120"/>
+                </a:cubicBezTo>
+                <a:cubicBezTo>
+                  <a:pt x="793447" y="487307"/>
+                  <a:pt x="770187" y="462076"/>
+                  <a:pt x="773095" y="408008"/>
+                </a:cubicBezTo>
+                <a:cubicBezTo>
+                  <a:pt x="773095" y="379172"/>
+                  <a:pt x="764373" y="339523"/>
+                  <a:pt x="793447" y="325106"/>
+                </a:cubicBezTo>
+                <a:cubicBezTo>
+                  <a:pt x="816707" y="310688"/>
+                  <a:pt x="848689" y="325106"/>
+                  <a:pt x="860319" y="350336"/>
+                </a:cubicBezTo>
+                <a:cubicBezTo>
+                  <a:pt x="874856" y="397195"/>
+                  <a:pt x="889393" y="440449"/>
+                  <a:pt x="938820" y="444054"/>
+                </a:cubicBezTo>
+                <a:cubicBezTo>
+                  <a:pt x="1005692" y="451262"/>
+                  <a:pt x="967894" y="422426"/>
+                  <a:pt x="956265" y="386381"/>
+                </a:cubicBezTo>
+                <a:cubicBezTo>
+                  <a:pt x="944635" y="346733"/>
+                  <a:pt x="979525" y="335919"/>
+                  <a:pt x="1002784" y="343127"/>
+                </a:cubicBezTo>
+                <a:cubicBezTo>
+                  <a:pt x="1090008" y="375569"/>
+                  <a:pt x="1180139" y="317897"/>
+                  <a:pt x="1270270" y="364755"/>
+                </a:cubicBezTo>
+                <a:cubicBezTo>
+                  <a:pt x="1247011" y="249411"/>
+                  <a:pt x="1197583" y="198949"/>
+                  <a:pt x="1092915" y="180926"/>
+                </a:cubicBezTo>
+                <a:cubicBezTo>
+                  <a:pt x="1055118" y="177322"/>
+                  <a:pt x="1014414" y="184530"/>
+                  <a:pt x="979525" y="152090"/>
+                </a:cubicBezTo>
+                <a:cubicBezTo>
+                  <a:pt x="959172" y="134068"/>
+                  <a:pt x="938820" y="112441"/>
+                  <a:pt x="953358" y="76396"/>
+                </a:cubicBezTo>
+                <a:cubicBezTo>
+                  <a:pt x="962080" y="51165"/>
+                  <a:pt x="985339" y="51165"/>
+                  <a:pt x="1005692" y="58373"/>
+                </a:cubicBezTo>
+                <a:cubicBezTo>
+                  <a:pt x="1090008" y="98023"/>
+                  <a:pt x="1180139" y="108837"/>
+                  <a:pt x="1267362" y="123254"/>
+                </a:cubicBezTo>
+                <a:cubicBezTo>
+                  <a:pt x="1281900" y="126859"/>
+                  <a:pt x="1296437" y="134068"/>
+                  <a:pt x="1310975" y="98023"/>
+                </a:cubicBezTo>
+                <a:cubicBezTo>
+                  <a:pt x="1260095" y="81803"/>
+                  <a:pt x="1209941" y="62879"/>
+                  <a:pt x="1159787" y="43505"/>
+                </a:cubicBezTo>
+                <a:close/>
+              </a:path>
+            </a:pathLst>
+          </a:custGeom>
+        </p:spPr>
+      </p:pic>
+      <p:sp>
+        <p:nvSpPr>
+          <p:cNvPr id="3" name="TextBox 2">
+            <a:extLst>
+              <a:ext uri="{FF2B5EF4-FFF2-40B4-BE49-F238E27FC236}">
+                <a16:creationId xmlns:a16="http://schemas.microsoft.com/office/drawing/2014/main" id="{541302B1-CDCF-10C4-5F3F-A7FFABE7620C}"/>
+              </a:ext>
+            </a:extLst>
+          </p:cNvPr>
+          <p:cNvSpPr txBox="1"/>
+          <p:nvPr/>
+        </p:nvSpPr>
+        <p:spPr>
+          <a:xfrm>
+            <a:off x="732182" y="1415846"/>
+            <a:ext cx="5014452" cy="4801314"/>
+          </a:xfrm>
+          <a:prstGeom prst="rect">
+            <a:avLst/>
+          </a:prstGeom>
+          <a:noFill/>
+        </p:spPr>
+        <p:txBody>
+          <a:bodyPr wrap="square" rtlCol="0">
+            <a:spAutoFit/>
+          </a:bodyPr>
+          <a:lstStyle/>
+          <a:p>
+            <a:pPr marL="285750" indent="-285750">
+              <a:buFont typeface="Arial" panose="020B0604020202020204" pitchFamily="34" charset="0"/>
+              <a:buChar char="•"/>
+            </a:pPr>
+            <a:r>
+              <a:rPr lang="en-US" dirty="0"/>
+              <a:t>Sparse Distributed representations (SDRs) are used for input patterns in the HTM language. </a:t>
+            </a:r>
+          </a:p>
+          <a:p>
+            <a:pPr marL="285750" indent="-285750">
+              <a:buFont typeface="Arial" panose="020B0604020202020204" pitchFamily="34" charset="0"/>
+              <a:buChar char="•"/>
+            </a:pPr>
+            <a:endParaRPr lang="en-US" dirty="0"/>
+          </a:p>
+          <a:p>
+            <a:pPr marL="285750" indent="-285750">
+              <a:buFont typeface="Arial" panose="020B0604020202020204" pitchFamily="34" charset="0"/>
+              <a:buChar char="•"/>
+            </a:pPr>
+            <a:r>
+              <a:rPr lang="en-US" dirty="0"/>
+              <a:t>SDRs are high-dimensional binary vectors with only a small fraction of bits set to 1, allowing them to store and process huge quantities of data efficiently. </a:t>
+            </a:r>
+          </a:p>
+          <a:p>
+            <a:pPr marL="285750" indent="-285750">
+              <a:buFont typeface="Arial" panose="020B0604020202020204" pitchFamily="34" charset="0"/>
+              <a:buChar char="•"/>
+            </a:pPr>
+            <a:endParaRPr lang="en-US" dirty="0"/>
+          </a:p>
+          <a:p>
+            <a:pPr marL="285750" indent="-285750">
+              <a:buFont typeface="Arial" panose="020B0604020202020204" pitchFamily="34" charset="0"/>
+              <a:buChar char="•"/>
+            </a:pPr>
+            <a:r>
+              <a:rPr lang="en-US" dirty="0"/>
+              <a:t>SDRs are vital in learning in HTM because two inputs with comparable semantic significance must have equal active bit representation.</a:t>
+            </a:r>
+          </a:p>
+          <a:p>
+            <a:pPr marL="285750" indent="-285750">
+              <a:buFont typeface="Arial" panose="020B0604020202020204" pitchFamily="34" charset="0"/>
+              <a:buChar char="•"/>
+            </a:pPr>
+            <a:endParaRPr lang="en-US" dirty="0"/>
+          </a:p>
+          <a:p>
+            <a:pPr marL="285750" indent="-285750">
+              <a:buFont typeface="Arial" panose="020B0604020202020204" pitchFamily="34" charset="0"/>
+              <a:buChar char="•"/>
+            </a:pPr>
+            <a:r>
+              <a:rPr lang="en-US" dirty="0"/>
+              <a:t> To use HTM, data must first be transformed into an SDR using an encoder that captures the data's significant semantic properties.</a:t>
+            </a:r>
+          </a:p>
+          <a:p>
+            <a:pPr marL="285750" indent="-285750">
+              <a:buFont typeface="Arial" panose="020B0604020202020204" pitchFamily="34" charset="0"/>
+              <a:buChar char="•"/>
+            </a:pPr>
+            <a:endParaRPr lang="en-US" dirty="0"/>
+          </a:p>
+          <a:p>
+            <a:pPr marL="285750" indent="-285750">
+              <a:buFont typeface="Arial" panose="020B0604020202020204" pitchFamily="34" charset="0"/>
+              <a:buChar char="•"/>
+            </a:pPr>
+            <a:endParaRPr lang="en-IN" dirty="0"/>
+          </a:p>
+        </p:txBody>
+      </p:sp>
+    </p:spTree>
+    <p:extLst>
+      <p:ext uri="{BB962C8B-B14F-4D97-AF65-F5344CB8AC3E}">
+        <p14:creationId xmlns:p14="http://schemas.microsoft.com/office/powerpoint/2010/main" val="1637384264"/>
+      </p:ext>
+    </p:extLst>
+  </p:cSld>
+  <p:clrMapOvr>
+    <a:masterClrMapping/>
+  </p:clrMapOvr>
+</p:sld>
+</file>
+
+<file path=ppt/slides/slide6.xml><?xml version="1.0" encoding="utf-8"?>
+<p:sld xmlns:a="http://schemas.openxmlformats.org/drawingml/2006/main" xmlns:r="http://schemas.openxmlformats.org/officeDocument/2006/relationships" xmlns:p="http://schemas.openxmlformats.org/presentationml/2006/main">
+  <p:cSld>
+    <p:bg>
+      <p:bgPr>
+        <a:solidFill>
+          <a:schemeClr val="bg1"/>
+        </a:solidFill>
+        <a:effectLst/>
+      </p:bgPr>
+    </p:bg>
+    <p:spTree>
+      <p:nvGrpSpPr>
+        <p:cNvPr id="1" name=""/>
+        <p:cNvGrpSpPr/>
+        <p:nvPr/>
+      </p:nvGrpSpPr>
+      <p:grpSpPr>
+        <a:xfrm>
+          <a:off x="0" y="0"/>
+          <a:ext cx="0" cy="0"/>
+          <a:chOff x="0" y="0"/>
+          <a:chExt cx="0" cy="0"/>
+        </a:xfrm>
+      </p:grpSpPr>
+      <p:sp useBgFill="1">
+        <p:nvSpPr>
+          <p:cNvPr id="15" name="Rectangle 14">
+            <a:extLst>
+              <a:ext uri="{FF2B5EF4-FFF2-40B4-BE49-F238E27FC236}">
+                <a16:creationId xmlns:a16="http://schemas.microsoft.com/office/drawing/2014/main" id="{ECC07320-C2CA-4E29-8481-9D9E143C7788}"/>
+              </a:ext>
+              <a:ext uri="{C183D7F6-B498-43B3-948B-1728B52AA6E4}">
+                <adec:decorative xmlns:adec="http://schemas.microsoft.com/office/drawing/2017/decorative" val="1"/>
+              </a:ext>
+            </a:extLst>
+          </p:cNvPr>
+          <p:cNvSpPr>
+            <a:spLocks noGrp="1" noRot="1" noChangeAspect="1" noMove="1" noResize="1" noEditPoints="1" noAdjustHandles="1" noChangeArrowheads="1" noChangeShapeType="1" noTextEdit="1"/>
+          </p:cNvSpPr>
+          <p:nvPr>
+            <p:extLst>
+              <p:ext uri="{386F3935-93C4-4BCD-93E2-E3B085C9AB24}">
+                <p16:designElem xmlns:p16="http://schemas.microsoft.com/office/powerpoint/2015/main" val="1"/>
+              </p:ext>
+            </p:extLst>
+          </p:nvPr>
+        </p:nvSpPr>
+        <p:spPr>
+          <a:xfrm>
+            <a:off x="-1" y="0"/>
+            <a:ext cx="12188952" cy="6858000"/>
+          </a:xfrm>
+          <a:prstGeom prst="rect">
+            <a:avLst/>
+          </a:prstGeom>
+          <a:ln>
+            <a:noFill/>
+          </a:ln>
+        </p:spPr>
+        <p:style>
+          <a:lnRef idx="2">
+            <a:schemeClr val="accent1">
+              <a:shade val="50000"/>
+            </a:schemeClr>
+          </a:lnRef>
+          <a:fillRef idx="1">
+            <a:schemeClr val="accent1"/>
+          </a:fillRef>
+          <a:effectRef idx="0">
+            <a:schemeClr val="accent1"/>
+          </a:effectRef>
+          <a:fontRef idx="minor">
+            <a:schemeClr val="lt1"/>
+          </a:fontRef>
+        </p:style>
+        <p:txBody>
+          <a:bodyPr rtlCol="0" anchor="ctr"/>
+          <a:lstStyle/>
+          <a:p>
+            <a:pPr algn="ctr"/>
+            <a:endParaRPr lang="en-US"/>
+          </a:p>
+        </p:txBody>
+      </p:sp>
+      <p:pic>
+        <p:nvPicPr>
+          <p:cNvPr id="4" name="Picture 3" descr="Different numbers in white flying around">
+            <a:extLst>
+              <a:ext uri="{FF2B5EF4-FFF2-40B4-BE49-F238E27FC236}">
+                <a16:creationId xmlns:a16="http://schemas.microsoft.com/office/drawing/2014/main" id="{B73026E4-D821-3705-5E43-FB5BE83A98C3}"/>
+              </a:ext>
+            </a:extLst>
+          </p:cNvPr>
+          <p:cNvPicPr>
+            <a:picLocks noChangeAspect="1"/>
+          </p:cNvPicPr>
+          <p:nvPr/>
+        </p:nvPicPr>
+        <p:blipFill rotWithShape="1">
+          <a:blip r:embed="rId2"/>
+          <a:srcRect t="2465" b="2971"/>
+          <a:stretch/>
+        </p:blipFill>
+        <p:spPr>
+          <a:xfrm>
+            <a:off x="1" y="10"/>
+            <a:ext cx="9669642" cy="6857990"/>
+          </a:xfrm>
+          <a:prstGeom prst="rect">
+            <a:avLst/>
+          </a:prstGeom>
+        </p:spPr>
+      </p:pic>
+      <p:sp>
+        <p:nvSpPr>
+          <p:cNvPr id="17" name="Rectangle 16">
+            <a:extLst>
+              <a:ext uri="{FF2B5EF4-FFF2-40B4-BE49-F238E27FC236}">
+                <a16:creationId xmlns:a16="http://schemas.microsoft.com/office/drawing/2014/main" id="{178FB36B-5BFE-42CA-BC60-1115E0D95EEC}"/>
+              </a:ext>
+              <a:ext uri="{C183D7F6-B498-43B3-948B-1728B52AA6E4}">
+                <adec:decorative xmlns:adec="http://schemas.microsoft.com/office/drawing/2017/decorative" val="1"/>
+              </a:ext>
+            </a:extLst>
+          </p:cNvPr>
+          <p:cNvSpPr>
+            <a:spLocks noGrp="1" noRot="1" noChangeAspect="1" noMove="1" noResize="1" noEditPoints="1" noAdjustHandles="1" noChangeArrowheads="1" noChangeShapeType="1" noTextEdit="1"/>
+          </p:cNvSpPr>
+          <p:nvPr>
+            <p:extLst>
+              <p:ext uri="{386F3935-93C4-4BCD-93E2-E3B085C9AB24}">
+                <p16:designElem xmlns:p16="http://schemas.microsoft.com/office/powerpoint/2015/main" val="1"/>
+              </p:ext>
+            </p:extLst>
+          </p:nvPr>
+        </p:nvSpPr>
+        <p:spPr>
+          <a:xfrm flipH="1">
+            <a:off x="5125019" y="0"/>
+            <a:ext cx="7066978" cy="6858000"/>
+          </a:xfrm>
+          <a:prstGeom prst="rect">
+            <a:avLst/>
+          </a:prstGeom>
+          <a:gradFill>
+            <a:gsLst>
+              <a:gs pos="48000">
+                <a:schemeClr val="bg1"/>
+              </a:gs>
+              <a:gs pos="35000">
+                <a:schemeClr val="bg1">
+                  <a:alpha val="77000"/>
+                </a:schemeClr>
+              </a:gs>
+              <a:gs pos="19000">
+                <a:schemeClr val="bg1">
+                  <a:alpha val="38000"/>
+                </a:schemeClr>
+              </a:gs>
+              <a:gs pos="0">
+                <a:schemeClr val="bg1">
+                  <a:alpha val="0"/>
+                </a:schemeClr>
+              </a:gs>
+              <a:gs pos="100000">
+                <a:schemeClr val="bg1"/>
+              </a:gs>
+            </a:gsLst>
+            <a:lin ang="10800000" scaled="0"/>
+          </a:gradFill>
+          <a:ln>
+            <a:noFill/>
+          </a:ln>
+        </p:spPr>
+        <p:style>
+          <a:lnRef idx="2">
+            <a:schemeClr val="accent1">
+              <a:shade val="50000"/>
+            </a:schemeClr>
+          </a:lnRef>
+          <a:fillRef idx="1">
+            <a:schemeClr val="accent1"/>
+          </a:fillRef>
+          <a:effectRef idx="0">
+            <a:schemeClr val="accent1"/>
+          </a:effectRef>
+          <a:fontRef idx="minor">
+            <a:schemeClr val="lt1"/>
+          </a:fontRef>
+        </p:style>
+        <p:txBody>
+          <a:bodyPr rtlCol="0" anchor="ctr"/>
+          <a:lstStyle/>
+          <a:p>
+            <a:pPr algn="ctr"/>
+            <a:endParaRPr lang="en-US" dirty="0"/>
+          </a:p>
+        </p:txBody>
+      </p:sp>
+      <p:sp>
+        <p:nvSpPr>
+          <p:cNvPr id="2" name="Title 1">
+            <a:extLst>
+              <a:ext uri="{FF2B5EF4-FFF2-40B4-BE49-F238E27FC236}">
+                <a16:creationId xmlns:a16="http://schemas.microsoft.com/office/drawing/2014/main" id="{9D16A129-8623-D385-31EC-24B8D7FBF6BB}"/>
+              </a:ext>
+            </a:extLst>
+          </p:cNvPr>
+          <p:cNvSpPr>
+            <a:spLocks noGrp="1"/>
+          </p:cNvSpPr>
+          <p:nvPr>
+            <p:ph type="title"/>
+          </p:nvPr>
+        </p:nvSpPr>
+        <p:spPr>
+          <a:xfrm>
+            <a:off x="7737974" y="733056"/>
+            <a:ext cx="4180398" cy="617762"/>
+          </a:xfrm>
+          <a:noFill/>
+        </p:spPr>
+        <p:txBody>
+          <a:bodyPr vert="horz" lIns="91440" tIns="45720" rIns="91440" bIns="45720" rtlCol="0" anchor="b">
+            <a:normAutofit/>
+          </a:bodyPr>
+          <a:lstStyle/>
+          <a:p>
+            <a:endParaRPr lang="en-US" sz="1800" dirty="0">
+              <a:latin typeface="+mn-lt"/>
+            </a:endParaRPr>
+          </a:p>
+        </p:txBody>
+      </p:sp>
+    </p:spTree>
+    <p:extLst>
+      <p:ext uri="{BB962C8B-B14F-4D97-AF65-F5344CB8AC3E}">
+        <p14:creationId xmlns:p14="http://schemas.microsoft.com/office/powerpoint/2010/main" val="2368416772"/>
+      </p:ext>
+    </p:extLst>
+  </p:cSld>
+  <p:clrMapOvr>
+    <a:masterClrMapping/>
+  </p:clrMapOvr>
+</p:sld>
+</file>
+
+<file path=ppt/slides/slide7.xml><?xml version="1.0" encoding="utf-8"?>
+<p:sld xmlns:a="http://schemas.openxmlformats.org/drawingml/2006/main" xmlns:r="http://schemas.openxmlformats.org/officeDocument/2006/relationships" xmlns:p="http://schemas.openxmlformats.org/presentationml/2006/main">
+  <p:cSld>
     <p:spTree>
       <p:nvGrpSpPr>
         <p:cNvPr id="1" name=""/>
@@ -2161,10 +3129,10 @@
       </p:grpSpPr>
       <p:sp>
         <p:nvSpPr>
-          <p:cNvPr id="7" name="Title 6">
+          <p:cNvPr id="2" name="Title 1">
             <a:extLst>
               <a:ext uri="{FF2B5EF4-FFF2-40B4-BE49-F238E27FC236}">
-                <a16:creationId xmlns:a16="http://schemas.microsoft.com/office/drawing/2014/main" id="{3E8FD3DC-D75D-57C5-F44D-437B8601DFEE}"/>
+                <a16:creationId xmlns:a16="http://schemas.microsoft.com/office/drawing/2014/main" id="{E9451C40-5629-BDDE-DC99-E998A2B6BF08}"/>
               </a:ext>
             </a:extLst>
           </p:cNvPr>
@@ -2187,7 +3155,7 @@
     </p:spTree>
     <p:extLst>
       <p:ext uri="{BB962C8B-B14F-4D97-AF65-F5344CB8AC3E}">
-        <p14:creationId xmlns:p14="http://schemas.microsoft.com/office/powerpoint/2010/main" val="1637384264"/>
+        <p14:creationId xmlns:p14="http://schemas.microsoft.com/office/powerpoint/2010/main" val="1540708089"/>
       </p:ext>
     </p:extLst>
   </p:cSld>

</xml_diff>